<commit_message>
Worked on pptx, added some demo points, added nodeapp for Demo2
</commit_message>
<xml_diff>
--- a/InjectionDeDépendances.pptx
+++ b/InjectionDeDépendances.pptx
@@ -5,25 +5,26 @@
     <p:sldMasterId id="2147483648" r:id="rId1"/>
   </p:sldMasterIdLst>
   <p:notesMasterIdLst>
-    <p:notesMasterId r:id="rId18"/>
+    <p:notesMasterId r:id="rId19"/>
   </p:notesMasterIdLst>
   <p:sldIdLst>
     <p:sldId id="256" r:id="rId2"/>
     <p:sldId id="307" r:id="rId3"/>
     <p:sldId id="278" r:id="rId4"/>
-    <p:sldId id="272" r:id="rId5"/>
-    <p:sldId id="313" r:id="rId6"/>
-    <p:sldId id="310" r:id="rId7"/>
-    <p:sldId id="314" r:id="rId8"/>
-    <p:sldId id="315" r:id="rId9"/>
-    <p:sldId id="306" r:id="rId10"/>
-    <p:sldId id="317" r:id="rId11"/>
-    <p:sldId id="308" r:id="rId12"/>
-    <p:sldId id="265" r:id="rId13"/>
-    <p:sldId id="304" r:id="rId14"/>
-    <p:sldId id="302" r:id="rId15"/>
-    <p:sldId id="286" r:id="rId16"/>
-    <p:sldId id="260" r:id="rId17"/>
+    <p:sldId id="319" r:id="rId5"/>
+    <p:sldId id="272" r:id="rId6"/>
+    <p:sldId id="313" r:id="rId7"/>
+    <p:sldId id="310" r:id="rId8"/>
+    <p:sldId id="314" r:id="rId9"/>
+    <p:sldId id="315" r:id="rId10"/>
+    <p:sldId id="306" r:id="rId11"/>
+    <p:sldId id="317" r:id="rId12"/>
+    <p:sldId id="308" r:id="rId13"/>
+    <p:sldId id="318" r:id="rId14"/>
+    <p:sldId id="265" r:id="rId15"/>
+    <p:sldId id="304" r:id="rId16"/>
+    <p:sldId id="286" r:id="rId17"/>
+    <p:sldId id="260" r:id="rId18"/>
   </p:sldIdLst>
   <p:sldSz cx="9144000" cy="6858000" type="screen4x3"/>
   <p:notesSz cx="6858000" cy="9144000"/>
@@ -207,7 +208,7 @@
           <a:p>
             <a:fld id="{21B0CDE1-C72D-4BD2-BEA1-D38FE4756D54}" type="datetimeFigureOut">
               <a:rPr lang="fr-BE" smtClean="0"/>
-              <a:t>22/11/2017</a:t>
+              <a:t>23/11/2017</a:t>
             </a:fld>
             <a:endParaRPr lang="fr-BE"/>
           </a:p>
@@ -631,7 +632,15 @@
             </a:r>
             <a:r>
               <a:rPr lang="fr-BE" baseline="0" dirty="0" smtClean="0"/>
-              <a:t>)</a:t>
+              <a:t>, </a:t>
+            </a:r>
+            <a:r>
+              <a:rPr lang="fr-BE" baseline="0" dirty="0" err="1" smtClean="0"/>
+              <a:t>Controlleurs</a:t>
+            </a:r>
+            <a:r>
+              <a:rPr lang="fr-BE" baseline="0" dirty="0" smtClean="0"/>
+              <a:t>…)</a:t>
             </a:r>
             <a:endParaRPr lang="fr-BE" dirty="0"/>
           </a:p>
@@ -723,7 +732,17 @@
             </a:r>
             <a:r>
               <a:rPr lang="fr-BE" baseline="0" dirty="0" smtClean="0"/>
-              <a:t> détails (présentation et stockage) dépendent du traitement (ou code métier), même si le flot d’exécution semble montrer l’inverse.</a:t>
+              <a:t> détails (présentation et stockage) dépendent du traitement (ou code métier), même si le flot d’exécution semble montrer l’inverse</a:t>
+            </a:r>
+            <a:r>
+              <a:rPr lang="fr-BE" baseline="0" dirty="0" smtClean="0"/>
+              <a:t>.</a:t>
+            </a:r>
+          </a:p>
+          <a:p>
+            <a:r>
+              <a:rPr lang="fr-BE" baseline="0" dirty="0" smtClean="0"/>
+              <a:t>Les modules de haut niveau définissent ce dont ils ont besoin; les modules de bas niveau fournissent les implémentations.</a:t>
             </a:r>
             <a:endParaRPr lang="fr-BE" dirty="0"/>
           </a:p>
@@ -746,7 +765,7 @@
           <a:p>
             <a:fld id="{E8238187-D67C-4F49-B4E5-06FAB330970E}" type="slidenum">
               <a:rPr lang="fr-BE" smtClean="0"/>
-              <a:t>6</a:t>
+              <a:t>7</a:t>
             </a:fld>
             <a:endParaRPr lang="fr-BE"/>
           </a:p>
@@ -838,7 +857,7 @@
           <a:p>
             <a:fld id="{E8238187-D67C-4F49-B4E5-06FAB330970E}" type="slidenum">
               <a:rPr lang="fr-BE" smtClean="0"/>
-              <a:t>8</a:t>
+              <a:t>9</a:t>
             </a:fld>
             <a:endParaRPr lang="fr-BE"/>
           </a:p>
@@ -903,7 +922,22 @@
           <a:p>
             <a:r>
               <a:rPr lang="fr-BE" dirty="0" smtClean="0"/>
-              <a:t>Finalement, n’est-ce pas</a:t>
+              <a:t>D’expérience, le</a:t>
+            </a:r>
+            <a:r>
+              <a:rPr lang="fr-BE" baseline="0" dirty="0" smtClean="0"/>
+              <a:t> mieux est de se tenir à l’injection par le constructeur.</a:t>
+            </a:r>
+            <a:endParaRPr lang="fr-BE" dirty="0" smtClean="0"/>
+          </a:p>
+          <a:p>
+            <a:r>
+              <a:rPr lang="fr-BE" dirty="0" smtClean="0"/>
+              <a:t>Finalement</a:t>
+            </a:r>
+            <a:r>
+              <a:rPr lang="fr-BE" dirty="0" smtClean="0"/>
+              <a:t>, n’est-ce pas</a:t>
             </a:r>
             <a:r>
               <a:rPr lang="fr-BE" baseline="0" dirty="0" smtClean="0"/>
@@ -930,7 +964,7 @@
           <a:p>
             <a:fld id="{E8238187-D67C-4F49-B4E5-06FAB330970E}" type="slidenum">
               <a:rPr lang="fr-BE" smtClean="0"/>
-              <a:t>10</a:t>
+              <a:t>11</a:t>
             </a:fld>
             <a:endParaRPr lang="fr-BE"/>
           </a:p>
@@ -940,6 +974,182 @@
     <p:extLst>
       <p:ext uri="{BB962C8B-B14F-4D97-AF65-F5344CB8AC3E}">
         <p14:creationId xmlns:p14="http://schemas.microsoft.com/office/powerpoint/2010/main" val="3661848055"/>
+      </p:ext>
+    </p:extLst>
+  </p:cSld>
+  <p:clrMapOvr>
+    <a:masterClrMapping/>
+  </p:clrMapOvr>
+</p:notes>
+</file>
+
+<file path=ppt/notesSlides/notesSlide6.xml><?xml version="1.0" encoding="utf-8"?>
+<p:notes xmlns:a="http://schemas.openxmlformats.org/drawingml/2006/main" xmlns:r="http://schemas.openxmlformats.org/officeDocument/2006/relationships" xmlns:p="http://schemas.openxmlformats.org/presentationml/2006/main">
+  <p:cSld>
+    <p:spTree>
+      <p:nvGrpSpPr>
+        <p:cNvPr id="1" name=""/>
+        <p:cNvGrpSpPr/>
+        <p:nvPr/>
+      </p:nvGrpSpPr>
+      <p:grpSpPr>
+        <a:xfrm>
+          <a:off x="0" y="0"/>
+          <a:ext cx="0" cy="0"/>
+          <a:chOff x="0" y="0"/>
+          <a:chExt cx="0" cy="0"/>
+        </a:xfrm>
+      </p:grpSpPr>
+      <p:sp>
+        <p:nvSpPr>
+          <p:cNvPr id="2" name="Slide Image Placeholder 1"/>
+          <p:cNvSpPr>
+            <a:spLocks noGrp="1" noRot="1" noChangeAspect="1"/>
+          </p:cNvSpPr>
+          <p:nvPr>
+            <p:ph type="sldImg"/>
+          </p:nvPr>
+        </p:nvSpPr>
+        <p:spPr/>
+      </p:sp>
+      <p:sp>
+        <p:nvSpPr>
+          <p:cNvPr id="3" name="Notes Placeholder 2"/>
+          <p:cNvSpPr>
+            <a:spLocks noGrp="1"/>
+          </p:cNvSpPr>
+          <p:nvPr>
+            <p:ph type="body" idx="1"/>
+          </p:nvPr>
+        </p:nvSpPr>
+        <p:spPr/>
+        <p:txBody>
+          <a:bodyPr/>
+          <a:lstStyle/>
+          <a:p>
+            <a:endParaRPr lang="fr-BE" dirty="0"/>
+          </a:p>
+        </p:txBody>
+      </p:sp>
+      <p:sp>
+        <p:nvSpPr>
+          <p:cNvPr id="4" name="Slide Number Placeholder 3"/>
+          <p:cNvSpPr>
+            <a:spLocks noGrp="1"/>
+          </p:cNvSpPr>
+          <p:nvPr>
+            <p:ph type="sldNum" sz="quarter" idx="10"/>
+          </p:nvPr>
+        </p:nvSpPr>
+        <p:spPr/>
+        <p:txBody>
+          <a:bodyPr/>
+          <a:lstStyle/>
+          <a:p>
+            <a:fld id="{E8238187-D67C-4F49-B4E5-06FAB330970E}" type="slidenum">
+              <a:rPr lang="fr-BE" smtClean="0"/>
+              <a:t>12</a:t>
+            </a:fld>
+            <a:endParaRPr lang="fr-BE"/>
+          </a:p>
+        </p:txBody>
+      </p:sp>
+    </p:spTree>
+    <p:extLst>
+      <p:ext uri="{BB962C8B-B14F-4D97-AF65-F5344CB8AC3E}">
+        <p14:creationId xmlns:p14="http://schemas.microsoft.com/office/powerpoint/2010/main" val="4172220084"/>
+      </p:ext>
+    </p:extLst>
+  </p:cSld>
+  <p:clrMapOvr>
+    <a:masterClrMapping/>
+  </p:clrMapOvr>
+</p:notes>
+</file>
+
+<file path=ppt/notesSlides/notesSlide7.xml><?xml version="1.0" encoding="utf-8"?>
+<p:notes xmlns:a="http://schemas.openxmlformats.org/drawingml/2006/main" xmlns:r="http://schemas.openxmlformats.org/officeDocument/2006/relationships" xmlns:p="http://schemas.openxmlformats.org/presentationml/2006/main">
+  <p:cSld>
+    <p:spTree>
+      <p:nvGrpSpPr>
+        <p:cNvPr id="1" name=""/>
+        <p:cNvGrpSpPr/>
+        <p:nvPr/>
+      </p:nvGrpSpPr>
+      <p:grpSpPr>
+        <a:xfrm>
+          <a:off x="0" y="0"/>
+          <a:ext cx="0" cy="0"/>
+          <a:chOff x="0" y="0"/>
+          <a:chExt cx="0" cy="0"/>
+        </a:xfrm>
+      </p:grpSpPr>
+      <p:sp>
+        <p:nvSpPr>
+          <p:cNvPr id="2" name="Slide Image Placeholder 1"/>
+          <p:cNvSpPr>
+            <a:spLocks noGrp="1" noRot="1" noChangeAspect="1"/>
+          </p:cNvSpPr>
+          <p:nvPr>
+            <p:ph type="sldImg"/>
+          </p:nvPr>
+        </p:nvSpPr>
+        <p:spPr/>
+      </p:sp>
+      <p:sp>
+        <p:nvSpPr>
+          <p:cNvPr id="3" name="Notes Placeholder 2"/>
+          <p:cNvSpPr>
+            <a:spLocks noGrp="1"/>
+          </p:cNvSpPr>
+          <p:nvPr>
+            <p:ph type="body" idx="1"/>
+          </p:nvPr>
+        </p:nvSpPr>
+        <p:spPr/>
+        <p:txBody>
+          <a:bodyPr/>
+          <a:lstStyle/>
+          <a:p>
+            <a:r>
+              <a:rPr lang="fr-BE" dirty="0" smtClean="0"/>
+              <a:t>Voir </a:t>
+            </a:r>
+            <a:r>
+              <a:rPr lang="fr-BE" dirty="0" err="1" smtClean="0"/>
+              <a:t>Mocks</a:t>
+            </a:r>
+            <a:endParaRPr lang="fr-BE" dirty="0"/>
+          </a:p>
+        </p:txBody>
+      </p:sp>
+      <p:sp>
+        <p:nvSpPr>
+          <p:cNvPr id="4" name="Slide Number Placeholder 3"/>
+          <p:cNvSpPr>
+            <a:spLocks noGrp="1"/>
+          </p:cNvSpPr>
+          <p:nvPr>
+            <p:ph type="sldNum" sz="quarter" idx="10"/>
+          </p:nvPr>
+        </p:nvSpPr>
+        <p:spPr/>
+        <p:txBody>
+          <a:bodyPr/>
+          <a:lstStyle/>
+          <a:p>
+            <a:fld id="{E8238187-D67C-4F49-B4E5-06FAB330970E}" type="slidenum">
+              <a:rPr lang="fr-BE" smtClean="0"/>
+              <a:t>13</a:t>
+            </a:fld>
+            <a:endParaRPr lang="fr-BE"/>
+          </a:p>
+        </p:txBody>
+      </p:sp>
+    </p:spTree>
+    <p:extLst>
+      <p:ext uri="{BB962C8B-B14F-4D97-AF65-F5344CB8AC3E}">
+        <p14:creationId xmlns:p14="http://schemas.microsoft.com/office/powerpoint/2010/main" val="3407880920"/>
       </p:ext>
     </p:extLst>
   </p:cSld>
@@ -1130,7 +1340,7 @@
           <a:p>
             <a:fld id="{D90D6EA7-48F2-44F7-84B2-998883B4142D}" type="datetimeFigureOut">
               <a:rPr lang="en-US" smtClean="0"/>
-              <a:t>11/22/2017</a:t>
+              <a:t>11/23/2017</a:t>
             </a:fld>
             <a:endParaRPr lang="en-US"/>
           </a:p>
@@ -1300,7 +1510,7 @@
           <a:p>
             <a:fld id="{D90D6EA7-48F2-44F7-84B2-998883B4142D}" type="datetimeFigureOut">
               <a:rPr lang="en-US" smtClean="0"/>
-              <a:t>11/22/2017</a:t>
+              <a:t>11/23/2017</a:t>
             </a:fld>
             <a:endParaRPr lang="en-US"/>
           </a:p>
@@ -1480,7 +1690,7 @@
           <a:p>
             <a:fld id="{D90D6EA7-48F2-44F7-84B2-998883B4142D}" type="datetimeFigureOut">
               <a:rPr lang="en-US" smtClean="0"/>
-              <a:t>11/22/2017</a:t>
+              <a:t>11/23/2017</a:t>
             </a:fld>
             <a:endParaRPr lang="en-US"/>
           </a:p>
@@ -1650,7 +1860,7 @@
           <a:p>
             <a:fld id="{D90D6EA7-48F2-44F7-84B2-998883B4142D}" type="datetimeFigureOut">
               <a:rPr lang="en-US" smtClean="0"/>
-              <a:t>11/22/2017</a:t>
+              <a:t>11/23/2017</a:t>
             </a:fld>
             <a:endParaRPr lang="en-US"/>
           </a:p>
@@ -1896,7 +2106,7 @@
           <a:p>
             <a:fld id="{D90D6EA7-48F2-44F7-84B2-998883B4142D}" type="datetimeFigureOut">
               <a:rPr lang="en-US" smtClean="0"/>
-              <a:t>11/22/2017</a:t>
+              <a:t>11/23/2017</a:t>
             </a:fld>
             <a:endParaRPr lang="en-US"/>
           </a:p>
@@ -2184,7 +2394,7 @@
           <a:p>
             <a:fld id="{D90D6EA7-48F2-44F7-84B2-998883B4142D}" type="datetimeFigureOut">
               <a:rPr lang="en-US" smtClean="0"/>
-              <a:t>11/22/2017</a:t>
+              <a:t>11/23/2017</a:t>
             </a:fld>
             <a:endParaRPr lang="en-US"/>
           </a:p>
@@ -2606,7 +2816,7 @@
           <a:p>
             <a:fld id="{D90D6EA7-48F2-44F7-84B2-998883B4142D}" type="datetimeFigureOut">
               <a:rPr lang="en-US" smtClean="0"/>
-              <a:t>11/22/2017</a:t>
+              <a:t>11/23/2017</a:t>
             </a:fld>
             <a:endParaRPr lang="en-US"/>
           </a:p>
@@ -2724,7 +2934,7 @@
           <a:p>
             <a:fld id="{D90D6EA7-48F2-44F7-84B2-998883B4142D}" type="datetimeFigureOut">
               <a:rPr lang="en-US" smtClean="0"/>
-              <a:t>11/22/2017</a:t>
+              <a:t>11/23/2017</a:t>
             </a:fld>
             <a:endParaRPr lang="en-US"/>
           </a:p>
@@ -2819,7 +3029,7 @@
           <a:p>
             <a:fld id="{D90D6EA7-48F2-44F7-84B2-998883B4142D}" type="datetimeFigureOut">
               <a:rPr lang="en-US" smtClean="0"/>
-              <a:t>11/22/2017</a:t>
+              <a:t>11/23/2017</a:t>
             </a:fld>
             <a:endParaRPr lang="en-US"/>
           </a:p>
@@ -3096,7 +3306,7 @@
           <a:p>
             <a:fld id="{D90D6EA7-48F2-44F7-84B2-998883B4142D}" type="datetimeFigureOut">
               <a:rPr lang="en-US" smtClean="0"/>
-              <a:t>11/22/2017</a:t>
+              <a:t>11/23/2017</a:t>
             </a:fld>
             <a:endParaRPr lang="en-US"/>
           </a:p>
@@ -3349,7 +3559,7 @@
           <a:p>
             <a:fld id="{D90D6EA7-48F2-44F7-84B2-998883B4142D}" type="datetimeFigureOut">
               <a:rPr lang="en-US" smtClean="0"/>
-              <a:t>11/22/2017</a:t>
+              <a:t>11/23/2017</a:t>
             </a:fld>
             <a:endParaRPr lang="en-US"/>
           </a:p>
@@ -3567,7 +3777,7 @@
           <a:p>
             <a:fld id="{D90D6EA7-48F2-44F7-84B2-998883B4142D}" type="datetimeFigureOut">
               <a:rPr lang="en-US" smtClean="0"/>
-              <a:t>11/22/2017</a:t>
+              <a:t>11/23/2017</a:t>
             </a:fld>
             <a:endParaRPr lang="en-US"/>
           </a:p>
@@ -4099,124 +4309,41 @@
             <a:spLocks noGrp="1"/>
           </p:cNvSpPr>
           <p:nvPr>
-            <p:ph type="title"/>
-          </p:nvPr>
-        </p:nvSpPr>
-        <p:spPr/>
-        <p:txBody>
-          <a:bodyPr/>
-          <a:lstStyle/>
-          <a:p>
-            <a:r>
-              <a:rPr lang="fr-BE" dirty="0" smtClean="0"/>
-              <a:t>Injection par le constructeur</a:t>
-            </a:r>
-            <a:endParaRPr lang="fr-BE" dirty="0"/>
-          </a:p>
-        </p:txBody>
-      </p:sp>
-      <p:sp>
-        <p:nvSpPr>
-          <p:cNvPr id="6" name="Title 3"/>
-          <p:cNvSpPr txBox="1">
-            <a:spLocks/>
-          </p:cNvSpPr>
-          <p:nvPr/>
-        </p:nvSpPr>
-        <p:spPr>
-          <a:xfrm>
-            <a:off x="685800" y="1484785"/>
-            <a:ext cx="7772400" cy="2448272"/>
-          </a:xfrm>
-          <a:prstGeom prst="rect">
-            <a:avLst/>
-          </a:prstGeom>
-        </p:spPr>
-        <p:txBody>
-          <a:bodyPr vert="horz" lIns="91440" tIns="45720" rIns="91440" bIns="45720" rtlCol="0" anchor="ctr">
+            <p:ph type="ctrTitle"/>
+          </p:nvPr>
+        </p:nvSpPr>
+        <p:spPr/>
+        <p:txBody>
+          <a:bodyPr>
             <a:normAutofit/>
           </a:bodyPr>
-          <a:lstStyle>
-            <a:lvl1pPr algn="ctr" defTabSz="914400" rtl="0" eaLnBrk="1" latinLnBrk="0" hangingPunct="1">
-              <a:spcBef>
-                <a:spcPct val="0"/>
-              </a:spcBef>
-              <a:buNone/>
-              <a:defRPr sz="4400" kern="1200">
-                <a:solidFill>
-                  <a:schemeClr val="tx1"/>
-                </a:solidFill>
-                <a:latin typeface="+mj-lt"/>
-                <a:ea typeface="+mj-ea"/>
-                <a:cs typeface="+mj-cs"/>
-              </a:defRPr>
-            </a:lvl1pPr>
-          </a:lstStyle>
-          <a:p>
-            <a:r>
-              <a:rPr lang="fr-BE" dirty="0" smtClean="0"/>
-              <a:t>Les abstractions requises comme paramètres du constructeur</a:t>
-            </a:r>
-            <a:endParaRPr lang="fr-BE" dirty="0"/>
-          </a:p>
-        </p:txBody>
-      </p:sp>
-      <p:sp>
-        <p:nvSpPr>
-          <p:cNvPr id="4" name="Title 3"/>
-          <p:cNvSpPr txBox="1">
-            <a:spLocks/>
-          </p:cNvSpPr>
-          <p:nvPr/>
-        </p:nvSpPr>
-        <p:spPr>
-          <a:xfrm>
-            <a:off x="683568" y="3426569"/>
-            <a:ext cx="7772400" cy="866527"/>
-          </a:xfrm>
-          <a:prstGeom prst="rect">
-            <a:avLst/>
-          </a:prstGeom>
-        </p:spPr>
-        <p:txBody>
-          <a:bodyPr vert="horz" lIns="91440" tIns="45720" rIns="91440" bIns="45720" rtlCol="0" anchor="ctr">
-            <a:normAutofit lnSpcReduction="10000"/>
-          </a:bodyPr>
-          <a:lstStyle>
-            <a:lvl1pPr algn="ctr" defTabSz="914400" rtl="0" eaLnBrk="1" latinLnBrk="0" hangingPunct="1">
-              <a:spcBef>
-                <a:spcPct val="0"/>
-              </a:spcBef>
-              <a:buNone/>
-              <a:defRPr sz="4400" kern="1200">
-                <a:solidFill>
-                  <a:schemeClr val="tx1"/>
-                </a:solidFill>
-                <a:latin typeface="+mj-lt"/>
-                <a:ea typeface="+mj-ea"/>
-                <a:cs typeface="+mj-cs"/>
-              </a:defRPr>
-            </a:lvl1pPr>
-          </a:lstStyle>
-          <a:p>
-            <a:r>
-              <a:rPr lang="fr-BE" sz="2800" dirty="0" smtClean="0"/>
-              <a:t>(d’autres approches sont aussi possibles mais réservées à des cas exceptionnels)</a:t>
-            </a:r>
-            <a:endParaRPr lang="fr-BE" sz="2800" dirty="0" smtClean="0"/>
+          <a:lstStyle/>
+          <a:p>
+            <a:r>
+              <a:rPr lang="fr-BE" sz="6000" dirty="0" smtClean="0"/>
+              <a:t>Comment?</a:t>
+            </a:r>
+            <a:endParaRPr lang="fr-BE" sz="6000" dirty="0"/>
           </a:p>
         </p:txBody>
       </p:sp>
     </p:spTree>
     <p:extLst>
       <p:ext uri="{BB962C8B-B14F-4D97-AF65-F5344CB8AC3E}">
-        <p14:creationId xmlns:p14="http://schemas.microsoft.com/office/powerpoint/2010/main" val="1851301076"/>
+        <p14:creationId xmlns:p14="http://schemas.microsoft.com/office/powerpoint/2010/main" val="3016808842"/>
       </p:ext>
     </p:extLst>
   </p:cSld>
   <p:clrMapOvr>
     <a:masterClrMapping/>
   </p:clrMapOvr>
+  <p:timing>
+    <p:tnLst>
+      <p:par>
+        <p:cTn id="1" dur="indefinite" restart="never" nodeType="tmRoot"/>
+      </p:par>
+    </p:tnLst>
+  </p:timing>
 </p:sld>
 </file>
 
@@ -4239,12 +4366,12 @@
       </p:grpSpPr>
       <p:sp>
         <p:nvSpPr>
-          <p:cNvPr id="4" name="Title 3"/>
-          <p:cNvSpPr>
-            <a:spLocks noGrp="1"/>
-          </p:cNvSpPr>
-          <p:nvPr>
-            <p:ph type="ctrTitle"/>
+          <p:cNvPr id="2" name="Title 1"/>
+          <p:cNvSpPr>
+            <a:spLocks noGrp="1"/>
+          </p:cNvSpPr>
+          <p:nvPr>
+            <p:ph type="title"/>
           </p:nvPr>
         </p:nvSpPr>
         <p:spPr/>
@@ -4255,30 +4382,114 @@
           <a:lstStyle/>
           <a:p>
             <a:r>
-              <a:rPr lang="fr-BE" sz="6000" dirty="0" smtClean="0"/>
-              <a:t>Démonstration 2</a:t>
-            </a:r>
-            <a:endParaRPr lang="fr-BE" sz="6000" dirty="0"/>
+              <a:rPr lang="fr-BE" sz="5400" dirty="0" smtClean="0"/>
+              <a:t>Injection par le constructeur</a:t>
+            </a:r>
+            <a:endParaRPr lang="fr-BE" sz="5400" dirty="0"/>
+          </a:p>
+        </p:txBody>
+      </p:sp>
+      <p:sp>
+        <p:nvSpPr>
+          <p:cNvPr id="6" name="Title 3"/>
+          <p:cNvSpPr txBox="1">
+            <a:spLocks/>
+          </p:cNvSpPr>
+          <p:nvPr/>
+        </p:nvSpPr>
+        <p:spPr>
+          <a:xfrm>
+            <a:off x="685800" y="1484785"/>
+            <a:ext cx="7772400" cy="2448272"/>
+          </a:xfrm>
+          <a:prstGeom prst="rect">
+            <a:avLst/>
+          </a:prstGeom>
+        </p:spPr>
+        <p:txBody>
+          <a:bodyPr vert="horz" lIns="91440" tIns="45720" rIns="91440" bIns="45720" rtlCol="0" anchor="ctr">
+            <a:normAutofit/>
+          </a:bodyPr>
+          <a:lstStyle>
+            <a:lvl1pPr algn="ctr" defTabSz="914400" rtl="0" eaLnBrk="1" latinLnBrk="0" hangingPunct="1">
+              <a:spcBef>
+                <a:spcPct val="0"/>
+              </a:spcBef>
+              <a:buNone/>
+              <a:defRPr sz="4400" kern="1200">
+                <a:solidFill>
+                  <a:schemeClr val="tx1"/>
+                </a:solidFill>
+                <a:latin typeface="+mj-lt"/>
+                <a:ea typeface="+mj-ea"/>
+                <a:cs typeface="+mj-cs"/>
+              </a:defRPr>
+            </a:lvl1pPr>
+          </a:lstStyle>
+          <a:p>
+            <a:r>
+              <a:rPr lang="fr-BE" dirty="0" smtClean="0"/>
+              <a:t>Les abstractions requises comme paramètres du constructeur</a:t>
+            </a:r>
+            <a:endParaRPr lang="fr-BE" dirty="0"/>
+          </a:p>
+        </p:txBody>
+      </p:sp>
+      <p:sp>
+        <p:nvSpPr>
+          <p:cNvPr id="4" name="Title 3"/>
+          <p:cNvSpPr txBox="1">
+            <a:spLocks/>
+          </p:cNvSpPr>
+          <p:nvPr/>
+        </p:nvSpPr>
+        <p:spPr>
+          <a:xfrm>
+            <a:off x="683568" y="3426569"/>
+            <a:ext cx="7772400" cy="866527"/>
+          </a:xfrm>
+          <a:prstGeom prst="rect">
+            <a:avLst/>
+          </a:prstGeom>
+        </p:spPr>
+        <p:txBody>
+          <a:bodyPr vert="horz" lIns="91440" tIns="45720" rIns="91440" bIns="45720" rtlCol="0" anchor="ctr">
+            <a:normAutofit lnSpcReduction="10000"/>
+          </a:bodyPr>
+          <a:lstStyle>
+            <a:lvl1pPr algn="ctr" defTabSz="914400" rtl="0" eaLnBrk="1" latinLnBrk="0" hangingPunct="1">
+              <a:spcBef>
+                <a:spcPct val="0"/>
+              </a:spcBef>
+              <a:buNone/>
+              <a:defRPr sz="4400" kern="1200">
+                <a:solidFill>
+                  <a:schemeClr val="tx1"/>
+                </a:solidFill>
+                <a:latin typeface="+mj-lt"/>
+                <a:ea typeface="+mj-ea"/>
+                <a:cs typeface="+mj-cs"/>
+              </a:defRPr>
+            </a:lvl1pPr>
+          </a:lstStyle>
+          <a:p>
+            <a:r>
+              <a:rPr lang="fr-BE" sz="2800" dirty="0" smtClean="0"/>
+              <a:t>(d’autres approches sont aussi possibles mais réservées à des cas exceptionnels)</a:t>
+            </a:r>
           </a:p>
         </p:txBody>
       </p:sp>
     </p:spTree>
     <p:extLst>
       <p:ext uri="{BB962C8B-B14F-4D97-AF65-F5344CB8AC3E}">
-        <p14:creationId xmlns:p14="http://schemas.microsoft.com/office/powerpoint/2010/main" val="2067025741"/>
+        <p14:creationId xmlns:p14="http://schemas.microsoft.com/office/powerpoint/2010/main" val="1851301076"/>
       </p:ext>
     </p:extLst>
   </p:cSld>
   <p:clrMapOvr>
     <a:masterClrMapping/>
   </p:clrMapOvr>
-  <p:timing>
-    <p:tnLst>
-      <p:par>
-        <p:cTn id="1" dur="indefinite" restart="never" nodeType="tmRoot"/>
-      </p:par>
-    </p:tnLst>
-  </p:timing>
 </p:sld>
 </file>
 
@@ -4318,7 +4529,7 @@
           <a:p>
             <a:r>
               <a:rPr lang="fr-BE" sz="6000" dirty="0" smtClean="0"/>
-              <a:t>Conclusions</a:t>
+              <a:t>Démonstration 2</a:t>
             </a:r>
             <a:endParaRPr lang="fr-BE" sz="6000" dirty="0"/>
           </a:p>
@@ -4327,7 +4538,7 @@
     </p:spTree>
     <p:extLst>
       <p:ext uri="{BB962C8B-B14F-4D97-AF65-F5344CB8AC3E}">
-        <p14:creationId xmlns:p14="http://schemas.microsoft.com/office/powerpoint/2010/main" val="291744831"/>
+        <p14:creationId xmlns:p14="http://schemas.microsoft.com/office/powerpoint/2010/main" val="2067025741"/>
       </p:ext>
     </p:extLst>
   </p:cSld>
@@ -4373,6 +4584,187 @@
         </p:nvSpPr>
         <p:spPr/>
         <p:txBody>
+          <a:bodyPr>
+            <a:normAutofit/>
+          </a:bodyPr>
+          <a:lstStyle/>
+          <a:p>
+            <a:r>
+              <a:rPr lang="fr-BE" sz="5400" dirty="0" smtClean="0"/>
+              <a:t>Oui, mais…</a:t>
+            </a:r>
+            <a:endParaRPr lang="fr-BE" sz="5400" dirty="0"/>
+          </a:p>
+        </p:txBody>
+      </p:sp>
+      <p:sp>
+        <p:nvSpPr>
+          <p:cNvPr id="6" name="Title 3"/>
+          <p:cNvSpPr txBox="1">
+            <a:spLocks/>
+          </p:cNvSpPr>
+          <p:nvPr/>
+        </p:nvSpPr>
+        <p:spPr>
+          <a:xfrm>
+            <a:off x="685800" y="1484784"/>
+            <a:ext cx="7772400" cy="4536503"/>
+          </a:xfrm>
+          <a:prstGeom prst="rect">
+            <a:avLst/>
+          </a:prstGeom>
+        </p:spPr>
+        <p:txBody>
+          <a:bodyPr vert="horz" lIns="91440" tIns="45720" rIns="91440" bIns="45720" rtlCol="0" anchor="ctr">
+            <a:normAutofit/>
+          </a:bodyPr>
+          <a:lstStyle>
+            <a:lvl1pPr algn="ctr" defTabSz="914400" rtl="0" eaLnBrk="1" latinLnBrk="0" hangingPunct="1">
+              <a:spcBef>
+                <a:spcPct val="0"/>
+              </a:spcBef>
+              <a:buNone/>
+              <a:defRPr sz="4400" kern="1200">
+                <a:solidFill>
+                  <a:schemeClr val="tx1"/>
+                </a:solidFill>
+                <a:latin typeface="+mj-lt"/>
+                <a:ea typeface="+mj-ea"/>
+                <a:cs typeface="+mj-cs"/>
+              </a:defRPr>
+            </a:lvl1pPr>
+          </a:lstStyle>
+          <a:p>
+            <a:r>
+              <a:rPr lang="fr-BE" dirty="0" smtClean="0"/>
+              <a:t>Indirection dans le code</a:t>
+            </a:r>
+          </a:p>
+          <a:p>
+            <a:endParaRPr lang="fr-BE" dirty="0" smtClean="0"/>
+          </a:p>
+          <a:p>
+            <a:r>
+              <a:rPr lang="fr-BE" dirty="0" smtClean="0"/>
+              <a:t>Plus d’efforts initiaux</a:t>
+            </a:r>
+          </a:p>
+          <a:p>
+            <a:endParaRPr lang="fr-BE" dirty="0" smtClean="0"/>
+          </a:p>
+          <a:p>
+            <a:r>
+              <a:rPr lang="fr-BE" dirty="0" smtClean="0"/>
+              <a:t>Plus de types</a:t>
+            </a:r>
+            <a:endParaRPr lang="fr-BE" dirty="0"/>
+          </a:p>
+        </p:txBody>
+      </p:sp>
+    </p:spTree>
+    <p:extLst>
+      <p:ext uri="{BB962C8B-B14F-4D97-AF65-F5344CB8AC3E}">
+        <p14:creationId xmlns:p14="http://schemas.microsoft.com/office/powerpoint/2010/main" val="2188794520"/>
+      </p:ext>
+    </p:extLst>
+  </p:cSld>
+  <p:clrMapOvr>
+    <a:masterClrMapping/>
+  </p:clrMapOvr>
+</p:sld>
+</file>
+
+<file path=ppt/slides/slide14.xml><?xml version="1.0" encoding="utf-8"?>
+<p:sld xmlns:a="http://schemas.openxmlformats.org/drawingml/2006/main" xmlns:r="http://schemas.openxmlformats.org/officeDocument/2006/relationships" xmlns:p="http://schemas.openxmlformats.org/presentationml/2006/main">
+  <p:cSld>
+    <p:spTree>
+      <p:nvGrpSpPr>
+        <p:cNvPr id="1" name=""/>
+        <p:cNvGrpSpPr/>
+        <p:nvPr/>
+      </p:nvGrpSpPr>
+      <p:grpSpPr>
+        <a:xfrm>
+          <a:off x="0" y="0"/>
+          <a:ext cx="0" cy="0"/>
+          <a:chOff x="0" y="0"/>
+          <a:chExt cx="0" cy="0"/>
+        </a:xfrm>
+      </p:grpSpPr>
+      <p:sp>
+        <p:nvSpPr>
+          <p:cNvPr id="4" name="Title 3"/>
+          <p:cNvSpPr>
+            <a:spLocks noGrp="1"/>
+          </p:cNvSpPr>
+          <p:nvPr>
+            <p:ph type="ctrTitle"/>
+          </p:nvPr>
+        </p:nvSpPr>
+        <p:spPr/>
+        <p:txBody>
+          <a:bodyPr>
+            <a:normAutofit/>
+          </a:bodyPr>
+          <a:lstStyle/>
+          <a:p>
+            <a:r>
+              <a:rPr lang="fr-BE" sz="6000" dirty="0" smtClean="0"/>
+              <a:t>Conclusions</a:t>
+            </a:r>
+            <a:endParaRPr lang="fr-BE" sz="6000" dirty="0"/>
+          </a:p>
+        </p:txBody>
+      </p:sp>
+    </p:spTree>
+    <p:extLst>
+      <p:ext uri="{BB962C8B-B14F-4D97-AF65-F5344CB8AC3E}">
+        <p14:creationId xmlns:p14="http://schemas.microsoft.com/office/powerpoint/2010/main" val="291744831"/>
+      </p:ext>
+    </p:extLst>
+  </p:cSld>
+  <p:clrMapOvr>
+    <a:masterClrMapping/>
+  </p:clrMapOvr>
+  <p:timing>
+    <p:tnLst>
+      <p:par>
+        <p:cTn id="1" dur="indefinite" restart="never" nodeType="tmRoot"/>
+      </p:par>
+    </p:tnLst>
+  </p:timing>
+</p:sld>
+</file>
+
+<file path=ppt/slides/slide15.xml><?xml version="1.0" encoding="utf-8"?>
+<p:sld xmlns:a="http://schemas.openxmlformats.org/drawingml/2006/main" xmlns:r="http://schemas.openxmlformats.org/officeDocument/2006/relationships" xmlns:p="http://schemas.openxmlformats.org/presentationml/2006/main">
+  <p:cSld>
+    <p:spTree>
+      <p:nvGrpSpPr>
+        <p:cNvPr id="1" name=""/>
+        <p:cNvGrpSpPr/>
+        <p:nvPr/>
+      </p:nvGrpSpPr>
+      <p:grpSpPr>
+        <a:xfrm>
+          <a:off x="0" y="0"/>
+          <a:ext cx="0" cy="0"/>
+          <a:chOff x="0" y="0"/>
+          <a:chExt cx="0" cy="0"/>
+        </a:xfrm>
+      </p:grpSpPr>
+      <p:sp>
+        <p:nvSpPr>
+          <p:cNvPr id="2" name="Title 1"/>
+          <p:cNvSpPr>
+            <a:spLocks noGrp="1"/>
+          </p:cNvSpPr>
+          <p:nvPr>
+            <p:ph type="title"/>
+          </p:nvPr>
+        </p:nvSpPr>
+        <p:spPr/>
+        <p:txBody>
           <a:bodyPr/>
           <a:lstStyle/>
           <a:p>
@@ -4400,7 +4792,13 @@
           <a:lstStyle/>
           <a:p>
             <a:r>
-              <a:rPr lang="fr-BE" dirty="0"/>
+              <a:rPr lang="fr-BE" dirty="0" smtClean="0"/>
+              <a:t>Définition</a:t>
+            </a:r>
+          </a:p>
+          <a:p>
+            <a:r>
+              <a:rPr lang="fr-BE" dirty="0" smtClean="0"/>
               <a:t>Pourquoi</a:t>
             </a:r>
             <a:r>
@@ -4470,89 +4868,7 @@
 </p:sld>
 </file>
 
-<file path=ppt/slides/slide14.xml><?xml version="1.0" encoding="utf-8"?>
-<p:sld xmlns:a="http://schemas.openxmlformats.org/drawingml/2006/main" xmlns:r="http://schemas.openxmlformats.org/officeDocument/2006/relationships" xmlns:p="http://schemas.openxmlformats.org/presentationml/2006/main">
-  <p:cSld>
-    <p:spTree>
-      <p:nvGrpSpPr>
-        <p:cNvPr id="1" name=""/>
-        <p:cNvGrpSpPr/>
-        <p:nvPr/>
-      </p:nvGrpSpPr>
-      <p:grpSpPr>
-        <a:xfrm>
-          <a:off x="0" y="0"/>
-          <a:ext cx="0" cy="0"/>
-          <a:chOff x="0" y="0"/>
-          <a:chExt cx="0" cy="0"/>
-        </a:xfrm>
-      </p:grpSpPr>
-      <p:sp>
-        <p:nvSpPr>
-          <p:cNvPr id="4" name="Title 3"/>
-          <p:cNvSpPr>
-            <a:spLocks noGrp="1"/>
-          </p:cNvSpPr>
-          <p:nvPr>
-            <p:ph type="ctrTitle"/>
-          </p:nvPr>
-        </p:nvSpPr>
-        <p:spPr/>
-        <p:txBody>
-          <a:bodyPr/>
-          <a:lstStyle/>
-          <a:p>
-            <a:r>
-              <a:rPr lang="fr-BE" dirty="0" smtClean="0"/>
-              <a:t>En bref</a:t>
-            </a:r>
-            <a:endParaRPr lang="fr-BE" dirty="0"/>
-          </a:p>
-        </p:txBody>
-      </p:sp>
-      <p:sp>
-        <p:nvSpPr>
-          <p:cNvPr id="6" name="Subtitle 5"/>
-          <p:cNvSpPr>
-            <a:spLocks noGrp="1"/>
-          </p:cNvSpPr>
-          <p:nvPr>
-            <p:ph type="subTitle" idx="1"/>
-          </p:nvPr>
-        </p:nvSpPr>
-        <p:spPr/>
-        <p:txBody>
-          <a:bodyPr/>
-          <a:lstStyle/>
-          <a:p>
-            <a:r>
-              <a:rPr lang="fr-BE" dirty="0"/>
-              <a:t>Du code testable est…</a:t>
-            </a:r>
-          </a:p>
-        </p:txBody>
-      </p:sp>
-    </p:spTree>
-    <p:extLst>
-      <p:ext uri="{BB962C8B-B14F-4D97-AF65-F5344CB8AC3E}">
-        <p14:creationId xmlns:p14="http://schemas.microsoft.com/office/powerpoint/2010/main" val="3138412214"/>
-      </p:ext>
-    </p:extLst>
-  </p:cSld>
-  <p:clrMapOvr>
-    <a:masterClrMapping/>
-  </p:clrMapOvr>
-  <p:timing>
-    <p:tnLst>
-      <p:par>
-        <p:cTn id="1" dur="indefinite" restart="never" nodeType="tmRoot"/>
-      </p:par>
-    </p:tnLst>
-  </p:timing>
-</p:sld>
-</file>
-
-<file path=ppt/slides/slide15.xml><?xml version="1.0" encoding="utf-8"?>
+<file path=ppt/slides/slide16.xml><?xml version="1.0" encoding="utf-8"?>
 <p:sld xmlns:a="http://schemas.openxmlformats.org/drawingml/2006/main" xmlns:r="http://schemas.openxmlformats.org/officeDocument/2006/relationships" xmlns:p="http://schemas.openxmlformats.org/presentationml/2006/main">
   <p:cSld>
     <p:spTree>
@@ -4673,7 +4989,7 @@
 </p:sld>
 </file>
 
-<file path=ppt/slides/slide16.xml><?xml version="1.0" encoding="utf-8"?>
+<file path=ppt/slides/slide17.xml><?xml version="1.0" encoding="utf-8"?>
 <p:sld xmlns:a="http://schemas.openxmlformats.org/drawingml/2006/main" xmlns:r="http://schemas.openxmlformats.org/officeDocument/2006/relationships" xmlns:p="http://schemas.openxmlformats.org/presentationml/2006/main">
   <p:cSld>
     <p:spTree>
@@ -4802,7 +5118,7 @@
           <a:lstStyle/>
           <a:p>
             <a:r>
-              <a:rPr lang="fr-BE" dirty="0" smtClean="0"/>
+              <a:rPr lang="fr-BE" sz="5400" dirty="0" smtClean="0"/>
               <a:t>Définition</a:t>
             </a:r>
             <a:endParaRPr lang="fr-BE" dirty="0"/>
@@ -4819,7 +5135,7 @@
         </p:nvSpPr>
         <p:spPr>
           <a:xfrm>
-            <a:off x="685800" y="908720"/>
+            <a:off x="685800" y="1025302"/>
             <a:ext cx="7772400" cy="675506"/>
           </a:xfrm>
           <a:prstGeom prst="rect">
@@ -4940,15 +5256,7 @@
           <a:p>
             <a:r>
               <a:rPr lang="fr-BE" sz="3200" dirty="0" smtClean="0"/>
-              <a:t>(plutôt que de le laisser les </a:t>
-            </a:r>
-            <a:r>
-              <a:rPr lang="fr-BE" sz="3200" dirty="0" smtClean="0"/>
-              <a:t>créer ou </a:t>
-            </a:r>
-            <a:r>
-              <a:rPr lang="fr-BE" sz="3200" dirty="0" smtClean="0"/>
-              <a:t>les trouver lui-même)</a:t>
+              <a:t>(plutôt que de le laisser les créer ou les trouver lui-même)</a:t>
             </a:r>
           </a:p>
         </p:txBody>
@@ -5052,6 +5360,118 @@
             <a:spLocks noGrp="1"/>
           </p:cNvSpPr>
           <p:nvPr>
+            <p:ph type="title"/>
+          </p:nvPr>
+        </p:nvSpPr>
+        <p:spPr/>
+        <p:txBody>
+          <a:bodyPr/>
+          <a:lstStyle/>
+          <a:p>
+            <a:r>
+              <a:rPr lang="fr-BE" dirty="0" smtClean="0"/>
+              <a:t>Récapitulatif</a:t>
+            </a:r>
+            <a:endParaRPr lang="fr-BE" dirty="0"/>
+          </a:p>
+        </p:txBody>
+      </p:sp>
+      <p:sp>
+        <p:nvSpPr>
+          <p:cNvPr id="3" name="Content Placeholder 2"/>
+          <p:cNvSpPr>
+            <a:spLocks noGrp="1"/>
+          </p:cNvSpPr>
+          <p:nvPr>
+            <p:ph idx="1"/>
+          </p:nvPr>
+        </p:nvSpPr>
+        <p:spPr/>
+        <p:txBody>
+          <a:bodyPr/>
+          <a:lstStyle/>
+          <a:p>
+            <a:r>
+              <a:rPr lang="fr-BE" dirty="0" smtClean="0"/>
+              <a:t>Création d’une </a:t>
+            </a:r>
+            <a:r>
+              <a:rPr lang="fr-BE" i="1" dirty="0" smtClean="0"/>
+              <a:t>abstraction</a:t>
+            </a:r>
+            <a:r>
+              <a:rPr lang="fr-BE" dirty="0" smtClean="0"/>
+              <a:t> dans le composant de haut niveau (Domain)</a:t>
+            </a:r>
+          </a:p>
+          <a:p>
+            <a:r>
+              <a:rPr lang="fr-BE" dirty="0" smtClean="0"/>
+              <a:t>Implémentation de cette </a:t>
+            </a:r>
+            <a:r>
+              <a:rPr lang="fr-BE" i="1" dirty="0" smtClean="0"/>
+              <a:t>abstraction</a:t>
+            </a:r>
+            <a:r>
+              <a:rPr lang="fr-BE" dirty="0" smtClean="0"/>
+              <a:t> dans un autre composant (Infra)</a:t>
+            </a:r>
+          </a:p>
+          <a:p>
+            <a:r>
+              <a:rPr lang="fr-BE" dirty="0" smtClean="0"/>
+              <a:t>Le </a:t>
+            </a:r>
+            <a:r>
+              <a:rPr lang="fr-BE" i="1" dirty="0" smtClean="0"/>
+              <a:t>point d’entrée</a:t>
+            </a:r>
+            <a:r>
+              <a:rPr lang="fr-BE" dirty="0" smtClean="0"/>
+              <a:t> est la glue (UI)</a:t>
+            </a:r>
+            <a:endParaRPr lang="fr-BE" i="1" dirty="0"/>
+          </a:p>
+        </p:txBody>
+      </p:sp>
+    </p:spTree>
+    <p:extLst>
+      <p:ext uri="{BB962C8B-B14F-4D97-AF65-F5344CB8AC3E}">
+        <p14:creationId xmlns:p14="http://schemas.microsoft.com/office/powerpoint/2010/main" val="2591644282"/>
+      </p:ext>
+    </p:extLst>
+  </p:cSld>
+  <p:clrMapOvr>
+    <a:masterClrMapping/>
+  </p:clrMapOvr>
+</p:sld>
+</file>
+
+<file path=ppt/slides/slide5.xml><?xml version="1.0" encoding="utf-8"?>
+<p:sld xmlns:a="http://schemas.openxmlformats.org/drawingml/2006/main" xmlns:r="http://schemas.openxmlformats.org/officeDocument/2006/relationships" xmlns:p="http://schemas.openxmlformats.org/presentationml/2006/main">
+  <p:cSld>
+    <p:spTree>
+      <p:nvGrpSpPr>
+        <p:cNvPr id="1" name=""/>
+        <p:cNvGrpSpPr/>
+        <p:nvPr/>
+      </p:nvGrpSpPr>
+      <p:grpSpPr>
+        <a:xfrm>
+          <a:off x="0" y="0"/>
+          <a:ext cx="0" cy="0"/>
+          <a:chOff x="0" y="0"/>
+          <a:chExt cx="0" cy="0"/>
+        </a:xfrm>
+      </p:grpSpPr>
+      <p:sp>
+        <p:nvSpPr>
+          <p:cNvPr id="2" name="Title 1"/>
+          <p:cNvSpPr>
+            <a:spLocks noGrp="1"/>
+          </p:cNvSpPr>
+          <p:nvPr>
             <p:ph type="ctrTitle"/>
           </p:nvPr>
         </p:nvSpPr>
@@ -5090,7 +5510,7 @@
 </p:sld>
 </file>
 
-<file path=ppt/slides/slide5.xml><?xml version="1.0" encoding="utf-8"?>
+<file path=ppt/slides/slide6.xml><?xml version="1.0" encoding="utf-8"?>
 <p:sld xmlns:a="http://schemas.openxmlformats.org/drawingml/2006/main" xmlns:r="http://schemas.openxmlformats.org/officeDocument/2006/relationships" xmlns:p="http://schemas.openxmlformats.org/presentationml/2006/main">
   <p:cSld>
     <p:spTree>
@@ -5123,7 +5543,7 @@
           <a:lstStyle/>
           <a:p>
             <a:r>
-              <a:rPr lang="fr-BE" dirty="0" smtClean="0"/>
+              <a:rPr lang="fr-BE" sz="5400" dirty="0" smtClean="0"/>
               <a:t>Découplage</a:t>
             </a:r>
             <a:endParaRPr lang="fr-BE" dirty="0"/>
@@ -5172,7 +5592,6 @@
               <a:rPr lang="fr-BE" dirty="0" smtClean="0"/>
               <a:t>Les composants de hauts niveau dépendent d’abstractions</a:t>
             </a:r>
-            <a:endParaRPr lang="fr-BE" dirty="0" smtClean="0"/>
           </a:p>
         </p:txBody>
       </p:sp>
@@ -5284,7 +5703,6 @@
               <a:rPr lang="fr-BE" sz="4000" dirty="0" smtClean="0"/>
               <a:t>d’exécution</a:t>
             </a:r>
-            <a:endParaRPr lang="fr-BE" sz="4000" dirty="0" smtClean="0"/>
           </a:p>
         </p:txBody>
       </p:sp>
@@ -5301,7 +5719,7 @@
 </p:sld>
 </file>
 
-<file path=ppt/slides/slide6.xml><?xml version="1.0" encoding="utf-8"?>
+<file path=ppt/slides/slide7.xml><?xml version="1.0" encoding="utf-8"?>
 <p:sld xmlns:a="http://schemas.openxmlformats.org/drawingml/2006/main" xmlns:r="http://schemas.openxmlformats.org/officeDocument/2006/relationships" xmlns:p="http://schemas.openxmlformats.org/presentationml/2006/main">
   <p:cSld>
     <p:spTree>
@@ -5879,163 +6297,6 @@
 </p:sld>
 </file>
 
-<file path=ppt/slides/slide7.xml><?xml version="1.0" encoding="utf-8"?>
-<p:sld xmlns:a="http://schemas.openxmlformats.org/drawingml/2006/main" xmlns:r="http://schemas.openxmlformats.org/officeDocument/2006/relationships" xmlns:p="http://schemas.openxmlformats.org/presentationml/2006/main">
-  <p:cSld>
-    <p:spTree>
-      <p:nvGrpSpPr>
-        <p:cNvPr id="1" name=""/>
-        <p:cNvGrpSpPr/>
-        <p:nvPr/>
-      </p:nvGrpSpPr>
-      <p:grpSpPr>
-        <a:xfrm>
-          <a:off x="0" y="0"/>
-          <a:ext cx="0" cy="0"/>
-          <a:chOff x="0" y="0"/>
-          <a:chExt cx="0" cy="0"/>
-        </a:xfrm>
-      </p:grpSpPr>
-      <p:sp>
-        <p:nvSpPr>
-          <p:cNvPr id="2" name="Title 1"/>
-          <p:cNvSpPr>
-            <a:spLocks noGrp="1"/>
-          </p:cNvSpPr>
-          <p:nvPr>
-            <p:ph type="title"/>
-          </p:nvPr>
-        </p:nvSpPr>
-        <p:spPr/>
-        <p:txBody>
-          <a:bodyPr/>
-          <a:lstStyle/>
-          <a:p>
-            <a:r>
-              <a:rPr lang="fr-BE" dirty="0" smtClean="0"/>
-              <a:t>Extensibilité</a:t>
-            </a:r>
-            <a:endParaRPr lang="fr-BE" dirty="0"/>
-          </a:p>
-        </p:txBody>
-      </p:sp>
-      <p:sp>
-        <p:nvSpPr>
-          <p:cNvPr id="6" name="Title 3"/>
-          <p:cNvSpPr txBox="1">
-            <a:spLocks/>
-          </p:cNvSpPr>
-          <p:nvPr/>
-        </p:nvSpPr>
-        <p:spPr>
-          <a:xfrm>
-            <a:off x="685800" y="1484785"/>
-            <a:ext cx="7772400" cy="2448272"/>
-          </a:xfrm>
-          <a:prstGeom prst="rect">
-            <a:avLst/>
-          </a:prstGeom>
-        </p:spPr>
-        <p:txBody>
-          <a:bodyPr vert="horz" lIns="91440" tIns="45720" rIns="91440" bIns="45720" rtlCol="0" anchor="ctr">
-            <a:normAutofit/>
-          </a:bodyPr>
-          <a:lstStyle>
-            <a:lvl1pPr algn="ctr" defTabSz="914400" rtl="0" eaLnBrk="1" latinLnBrk="0" hangingPunct="1">
-              <a:spcBef>
-                <a:spcPct val="0"/>
-              </a:spcBef>
-              <a:buNone/>
-              <a:defRPr sz="4400" kern="1200">
-                <a:solidFill>
-                  <a:schemeClr val="tx1"/>
-                </a:solidFill>
-                <a:latin typeface="+mj-lt"/>
-                <a:ea typeface="+mj-ea"/>
-                <a:cs typeface="+mj-cs"/>
-              </a:defRPr>
-            </a:lvl1pPr>
-          </a:lstStyle>
-          <a:p>
-            <a:r>
-              <a:rPr lang="fr-BE" dirty="0" smtClean="0"/>
-              <a:t>Les abstractions permettent la substitution</a:t>
-            </a:r>
-            <a:endParaRPr lang="fr-BE" dirty="0"/>
-          </a:p>
-        </p:txBody>
-      </p:sp>
-      <p:sp>
-        <p:nvSpPr>
-          <p:cNvPr id="7" name="Title 3"/>
-          <p:cNvSpPr txBox="1">
-            <a:spLocks/>
-          </p:cNvSpPr>
-          <p:nvPr/>
-        </p:nvSpPr>
-        <p:spPr>
-          <a:xfrm>
-            <a:off x="683568" y="3717032"/>
-            <a:ext cx="7772400" cy="1802631"/>
-          </a:xfrm>
-          <a:prstGeom prst="rect">
-            <a:avLst/>
-          </a:prstGeom>
-        </p:spPr>
-        <p:txBody>
-          <a:bodyPr vert="horz" lIns="91440" tIns="45720" rIns="91440" bIns="45720" rtlCol="0" anchor="ctr">
-            <a:normAutofit/>
-          </a:bodyPr>
-          <a:lstStyle>
-            <a:lvl1pPr algn="ctr" defTabSz="914400" rtl="0" eaLnBrk="1" latinLnBrk="0" hangingPunct="1">
-              <a:spcBef>
-                <a:spcPct val="0"/>
-              </a:spcBef>
-              <a:buNone/>
-              <a:defRPr sz="4400" kern="1200">
-                <a:solidFill>
-                  <a:schemeClr val="tx1"/>
-                </a:solidFill>
-                <a:latin typeface="+mj-lt"/>
-                <a:ea typeface="+mj-ea"/>
-                <a:cs typeface="+mj-cs"/>
-              </a:defRPr>
-            </a:lvl1pPr>
-          </a:lstStyle>
-          <a:p>
-            <a:r>
-              <a:rPr lang="fr-BE" sz="3200" dirty="0" smtClean="0"/>
-              <a:t>Du </a:t>
-            </a:r>
-            <a:r>
-              <a:rPr lang="fr-BE" sz="3200" dirty="0"/>
-              <a:t>code extensible est </a:t>
-            </a:r>
-            <a:r>
-              <a:rPr lang="fr-BE" sz="3200" dirty="0" smtClean="0"/>
-              <a:t>naturellement plus </a:t>
-            </a:r>
-            <a:r>
-              <a:rPr lang="fr-BE" sz="3200" dirty="0"/>
-              <a:t>facile à maintenir</a:t>
-            </a:r>
-            <a:endParaRPr lang="fr-BE" sz="3200" dirty="0"/>
-          </a:p>
-        </p:txBody>
-      </p:sp>
-    </p:spTree>
-    <p:extLst>
-      <p:ext uri="{BB962C8B-B14F-4D97-AF65-F5344CB8AC3E}">
-        <p14:creationId xmlns:p14="http://schemas.microsoft.com/office/powerpoint/2010/main" val="3856173804"/>
-      </p:ext>
-    </p:extLst>
-  </p:cSld>
-  <p:clrMapOvr>
-    <a:masterClrMapping/>
-  </p:clrMapOvr>
-</p:sld>
-</file>
-
 <file path=ppt/slides/slide8.xml><?xml version="1.0" encoding="utf-8"?>
 <p:sld xmlns:a="http://schemas.openxmlformats.org/drawingml/2006/main" xmlns:r="http://schemas.openxmlformats.org/officeDocument/2006/relationships" xmlns:p="http://schemas.openxmlformats.org/presentationml/2006/main">
   <p:cSld>
@@ -6069,8 +6330,8 @@
           <a:lstStyle/>
           <a:p>
             <a:r>
-              <a:rPr lang="fr-BE" dirty="0" smtClean="0"/>
-              <a:t>Tests</a:t>
+              <a:rPr lang="fr-BE" sz="5400" dirty="0" smtClean="0"/>
+              <a:t>Extensibilité</a:t>
             </a:r>
             <a:endParaRPr lang="fr-BE" dirty="0"/>
           </a:p>
@@ -6116,16 +6377,73 @@
           <a:p>
             <a:r>
               <a:rPr lang="fr-BE" dirty="0" smtClean="0"/>
-              <a:t>Des implémentations fictives peuvent être utilisés pour tester</a:t>
+              <a:t>Les abstractions permettent la substitution</a:t>
             </a:r>
             <a:endParaRPr lang="fr-BE" dirty="0"/>
+          </a:p>
+        </p:txBody>
+      </p:sp>
+      <p:sp>
+        <p:nvSpPr>
+          <p:cNvPr id="7" name="Title 3"/>
+          <p:cNvSpPr txBox="1">
+            <a:spLocks/>
+          </p:cNvSpPr>
+          <p:nvPr/>
+        </p:nvSpPr>
+        <p:spPr>
+          <a:xfrm>
+            <a:off x="683568" y="3717032"/>
+            <a:ext cx="7772400" cy="1802631"/>
+          </a:xfrm>
+          <a:prstGeom prst="rect">
+            <a:avLst/>
+          </a:prstGeom>
+        </p:spPr>
+        <p:txBody>
+          <a:bodyPr vert="horz" lIns="91440" tIns="45720" rIns="91440" bIns="45720" rtlCol="0" anchor="ctr">
+            <a:normAutofit/>
+          </a:bodyPr>
+          <a:lstStyle>
+            <a:lvl1pPr algn="ctr" defTabSz="914400" rtl="0" eaLnBrk="1" latinLnBrk="0" hangingPunct="1">
+              <a:spcBef>
+                <a:spcPct val="0"/>
+              </a:spcBef>
+              <a:buNone/>
+              <a:defRPr sz="4400" kern="1200">
+                <a:solidFill>
+                  <a:schemeClr val="tx1"/>
+                </a:solidFill>
+                <a:latin typeface="+mj-lt"/>
+                <a:ea typeface="+mj-ea"/>
+                <a:cs typeface="+mj-cs"/>
+              </a:defRPr>
+            </a:lvl1pPr>
+          </a:lstStyle>
+          <a:p>
+            <a:r>
+              <a:rPr lang="fr-BE" sz="3200" dirty="0" smtClean="0"/>
+              <a:t>Du </a:t>
+            </a:r>
+            <a:r>
+              <a:rPr lang="fr-BE" sz="3200" dirty="0"/>
+              <a:t>code extensible est </a:t>
+            </a:r>
+            <a:r>
+              <a:rPr lang="fr-BE" sz="3200" dirty="0" smtClean="0"/>
+              <a:t>naturellement plus </a:t>
+            </a:r>
+            <a:r>
+              <a:rPr lang="fr-BE" sz="3200" dirty="0"/>
+              <a:t>facile à maintenir</a:t>
+            </a:r>
           </a:p>
         </p:txBody>
       </p:sp>
     </p:spTree>
     <p:extLst>
       <p:ext uri="{BB962C8B-B14F-4D97-AF65-F5344CB8AC3E}">
-        <p14:creationId xmlns:p14="http://schemas.microsoft.com/office/powerpoint/2010/main" val="1145978053"/>
+        <p14:creationId xmlns:p14="http://schemas.microsoft.com/office/powerpoint/2010/main" val="3856173804"/>
       </p:ext>
     </p:extLst>
   </p:cSld>
@@ -6159,41 +6477,78 @@
             <a:spLocks noGrp="1"/>
           </p:cNvSpPr>
           <p:nvPr>
-            <p:ph type="ctrTitle"/>
-          </p:nvPr>
-        </p:nvSpPr>
-        <p:spPr/>
-        <p:txBody>
-          <a:bodyPr>
+            <p:ph type="title"/>
+          </p:nvPr>
+        </p:nvSpPr>
+        <p:spPr/>
+        <p:txBody>
+          <a:bodyPr/>
+          <a:lstStyle/>
+          <a:p>
+            <a:r>
+              <a:rPr lang="fr-BE" sz="5400" dirty="0" smtClean="0"/>
+              <a:t>Tests</a:t>
+            </a:r>
+            <a:endParaRPr lang="fr-BE" dirty="0"/>
+          </a:p>
+        </p:txBody>
+      </p:sp>
+      <p:sp>
+        <p:nvSpPr>
+          <p:cNvPr id="6" name="Title 3"/>
+          <p:cNvSpPr txBox="1">
+            <a:spLocks/>
+          </p:cNvSpPr>
+          <p:nvPr/>
+        </p:nvSpPr>
+        <p:spPr>
+          <a:xfrm>
+            <a:off x="685800" y="1484785"/>
+            <a:ext cx="7772400" cy="2448272"/>
+          </a:xfrm>
+          <a:prstGeom prst="rect">
+            <a:avLst/>
+          </a:prstGeom>
+        </p:spPr>
+        <p:txBody>
+          <a:bodyPr vert="horz" lIns="91440" tIns="45720" rIns="91440" bIns="45720" rtlCol="0" anchor="ctr">
             <a:normAutofit/>
           </a:bodyPr>
-          <a:lstStyle/>
-          <a:p>
-            <a:r>
-              <a:rPr lang="fr-BE" sz="6000" dirty="0" smtClean="0"/>
-              <a:t>Comment?</a:t>
-            </a:r>
-            <a:endParaRPr lang="fr-BE" sz="6000" dirty="0"/>
+          <a:lstStyle>
+            <a:lvl1pPr algn="ctr" defTabSz="914400" rtl="0" eaLnBrk="1" latinLnBrk="0" hangingPunct="1">
+              <a:spcBef>
+                <a:spcPct val="0"/>
+              </a:spcBef>
+              <a:buNone/>
+              <a:defRPr sz="4400" kern="1200">
+                <a:solidFill>
+                  <a:schemeClr val="tx1"/>
+                </a:solidFill>
+                <a:latin typeface="+mj-lt"/>
+                <a:ea typeface="+mj-ea"/>
+                <a:cs typeface="+mj-cs"/>
+              </a:defRPr>
+            </a:lvl1pPr>
+          </a:lstStyle>
+          <a:p>
+            <a:r>
+              <a:rPr lang="fr-BE" dirty="0" smtClean="0"/>
+              <a:t>Des implémentations fictives peuvent être utilisés pour tester</a:t>
+            </a:r>
+            <a:endParaRPr lang="fr-BE" dirty="0"/>
           </a:p>
         </p:txBody>
       </p:sp>
     </p:spTree>
     <p:extLst>
       <p:ext uri="{BB962C8B-B14F-4D97-AF65-F5344CB8AC3E}">
-        <p14:creationId xmlns:p14="http://schemas.microsoft.com/office/powerpoint/2010/main" val="3016808842"/>
+        <p14:creationId xmlns:p14="http://schemas.microsoft.com/office/powerpoint/2010/main" val="1145978053"/>
       </p:ext>
     </p:extLst>
   </p:cSld>
   <p:clrMapOvr>
     <a:masterClrMapping/>
   </p:clrMapOvr>
-  <p:timing>
-    <p:tnLst>
-      <p:par>
-        <p:cTn id="1" dur="indefinite" restart="never" nodeType="tmRoot"/>
-      </p:par>
-    </p:tnLst>
-  </p:timing>
 </p:sld>
 </file>
 

</xml_diff>